<commit_message>
Fix logo paths in IBM solution briefings
Updated logo paths from incorrect 'doc-tools' to correct 'converters' directory:
- Changed: eof-tools/doc-tools/brands/default/assets/logos/
- To: ../../../../../../eof-tools/converters/brands/default/assets/logos/

This ensures client_logo, footer_logo_left, and footer_logo_right are
properly embedded in the generated PowerPoint presentations.

Regenerated both OpenShift and Ansible solution briefing PPTX files
with embedded logos.
</commit_message>
<xml_diff>
--- a/solutions/ibm/cloud/openshift-container-platform/presales/solution-briefing.pptx
+++ b/solutions/ibm/cloud/openshift-container-platform/presales/solution-briefing.pptx
@@ -118,6 +118,9 @@
     <p:ext uri="{EFAFB233-063F-42B5-8137-9DF3F51BA10A}">
       <p15:sldGuideLst xmlns:p15="http://schemas.microsoft.com/office/powerpoint/2012/main"/>
     </p:ext>
+    <p:ext uri="{2D200454-40CA-4A62-9FC3-DE9A4176ACB9}">
+      <p15:notesGuideLst xmlns:p15="http://schemas.microsoft.com/office/powerpoint/2012/main"/>
+    </p:ext>
   </p:extLst>
 </p:presentation>
 </file>
@@ -144,6 +147,59 @@
           <a:chExt cx="0" cy="0"/>
         </a:xfrm>
       </p:grpSpPr>
+      <p:sp>
+        <p:nvSpPr>
+          <p:cNvPr id="2" name="Slide Image Placeholder 1"/>
+          <p:cNvSpPr>
+            <a:spLocks noGrp="1" noRot="1" noChangeAspect="1"/>
+          </p:cNvSpPr>
+          <p:nvPr>
+            <p:ph type="sldImg"/>
+          </p:nvPr>
+        </p:nvSpPr>
+        <p:spPr>
+          <a:xfrm>
+            <a:off x="-171450" y="1143000"/>
+            <a:ext cx="5486400" cy="3086100"/>
+          </a:xfrm>
+          <a:prstGeom prst="rect">
+            <a:avLst/>
+          </a:prstGeom>
+          <a:noFill/>
+          <a:ln w="12700">
+            <a:solidFill>
+              <a:prstClr val="black"/>
+            </a:solidFill>
+          </a:ln>
+        </p:spPr>
+      </p:sp>
+      <p:sp>
+        <p:nvSpPr>
+          <p:cNvPr id="3" name="Notes Placeholder 2"/>
+          <p:cNvSpPr>
+            <a:spLocks noGrp="1"/>
+          </p:cNvSpPr>
+          <p:nvPr>
+            <p:ph type="body" idx="1"/>
+          </p:nvPr>
+        </p:nvSpPr>
+        <p:spPr>
+          <a:xfrm>
+            <a:off x="514350" y="4400550"/>
+            <a:ext cx="4114800" cy="3600450"/>
+          </a:xfrm>
+          <a:prstGeom prst="rect">
+            <a:avLst/>
+          </a:prstGeom>
+        </p:spPr>
+        <p:txBody>
+          <a:bodyPr/>
+          <a:lstStyle/>
+          <a:p>
+            <a:endParaRPr lang="en-US"/>
+          </a:p>
+        </p:txBody>
+      </p:sp>
     </p:spTree>
     <p:extLst>
       <p:ext uri="{BB962C8B-B14F-4D97-AF65-F5344CB8AC3E}">

</xml_diff>